<commit_message>
added "remove caption" button to last UI slide.
</commit_message>
<xml_diff>
--- a/CC.pptx
+++ b/CC.pptx
@@ -12765,7 +12765,7 @@
       </p:grpSpPr>
       <p:pic>
         <p:nvPicPr>
-          <p:cNvPr id="4" name="Content Placeholder 3" descr="mockupEditMode2.jpg"/>
+          <p:cNvPr id="6" name="Content Placeholder 5" descr="mockupEditMode2.jpg"/>
           <p:cNvPicPr>
             <a:picLocks noGrp="1" noChangeAspect="1"/>
           </p:cNvPicPr>
@@ -12781,8 +12781,8 @@
         </p:blipFill>
         <p:spPr>
           <a:xfrm>
-            <a:off x="761581" y="990600"/>
-            <a:ext cx="7544219" cy="5638800"/>
+            <a:off x="710083" y="914400"/>
+            <a:ext cx="7748117" cy="5791200"/>
           </a:xfrm>
         </p:spPr>
       </p:pic>
@@ -12938,14 +12938,10 @@
           <a:p>
             <a:r>
               <a:rPr lang="en-US" dirty="0" smtClean="0"/>
-              <a:t>JavaScript roll into Firefox extension </a:t>
+              <a:t>JavaScript roll into Firefox extension - </a:t>
             </a:r>
             <a:r>
-              <a:rPr lang="en-US" smtClean="0"/>
-              <a:t>- </a:t>
-            </a:r>
-            <a:r>
-              <a:rPr lang="en-US" i="1" smtClean="0"/>
+              <a:rPr lang="en-US" i="1" dirty="0" smtClean="0"/>
               <a:t>April 14th</a:t>
             </a:r>
             <a:endParaRPr lang="en-US" dirty="0" smtClean="0"/>

</xml_diff>

<commit_message>
Added backup slide for risks
</commit_message>
<xml_diff>
--- a/CC.pptx
+++ b/CC.pptx
@@ -5,7 +5,7 @@
     <p:sldMasterId id="2147483912" r:id="rId1"/>
   </p:sldMasterIdLst>
   <p:notesMasterIdLst>
-    <p:notesMasterId r:id="rId24"/>
+    <p:notesMasterId r:id="rId26"/>
   </p:notesMasterIdLst>
   <p:sldIdLst>
     <p:sldId id="268" r:id="rId2"/>
@@ -30,6 +30,8 @@
     <p:sldId id="274" r:id="rId21"/>
     <p:sldId id="267" r:id="rId22"/>
     <p:sldId id="271" r:id="rId23"/>
+    <p:sldId id="281" r:id="rId24"/>
+    <p:sldId id="282" r:id="rId25"/>
   </p:sldIdLst>
   <p:sldSz cx="9144000" cy="6858000" type="screen4x3"/>
   <p:notesSz cx="6858000" cy="9144000"/>
@@ -3239,8 +3241,8 @@
     <dgm:cxn modelId="{38909320-D270-4DD8-985B-2E201743930F}" type="presOf" srcId="{7973E9F7-F023-457A-B616-0300C5072C3A}" destId="{CA1E2BF1-B0AB-4895-B69A-2F7B3B42EF3C}" srcOrd="0" destOrd="2" presId="urn:microsoft.com/office/officeart/2005/8/layout/list1"/>
     <dgm:cxn modelId="{E84BB915-9E93-400B-AFDA-7EF0E3C388C9}" type="presOf" srcId="{8722A5F9-14D6-4CE9-8029-B2CF02479303}" destId="{F3E948EE-4371-45E5-A293-95F38FE809F0}" srcOrd="0" destOrd="0" presId="urn:microsoft.com/office/officeart/2005/8/layout/list1"/>
     <dgm:cxn modelId="{93236B52-AF51-4C00-A48D-BC2FBA481EB9}" srcId="{39BF1797-AF98-49D0-B587-7D2FE95969A2}" destId="{7B0F4F9E-478D-4EED-8F73-DB662091163B}" srcOrd="1" destOrd="0" parTransId="{282F2255-B34A-4BDD-8C14-2E7F7F37DFD6}" sibTransId="{4C206C40-2E5F-4996-AF91-9A4CBFE4CC37}"/>
+    <dgm:cxn modelId="{D42792C6-22C5-46BF-8793-1D07FFDC02FA}" srcId="{39BF1797-AF98-49D0-B587-7D2FE95969A2}" destId="{0CD7446A-9BA1-4526-85AF-E0857FA2A09E}" srcOrd="6" destOrd="0" parTransId="{92F15A59-929B-4DCF-A5C6-5ACC068639B2}" sibTransId="{F2B69293-7BF2-45B1-82DC-43AFAD1F16F1}"/>
     <dgm:cxn modelId="{6C7859C2-6BDC-48A0-B9E2-6CE41255A9C6}" srcId="{39BF1797-AF98-49D0-B587-7D2FE95969A2}" destId="{7973E9F7-F023-457A-B616-0300C5072C3A}" srcOrd="2" destOrd="0" parTransId="{8F4CBCF4-7048-43E0-A6A6-EF48447175EC}" sibTransId="{8860994C-7409-4A9F-BCE1-0BB2C901CC49}"/>
-    <dgm:cxn modelId="{D42792C6-22C5-46BF-8793-1D07FFDC02FA}" srcId="{39BF1797-AF98-49D0-B587-7D2FE95969A2}" destId="{0CD7446A-9BA1-4526-85AF-E0857FA2A09E}" srcOrd="6" destOrd="0" parTransId="{92F15A59-929B-4DCF-A5C6-5ACC068639B2}" sibTransId="{F2B69293-7BF2-45B1-82DC-43AFAD1F16F1}"/>
     <dgm:cxn modelId="{561E0F04-FD23-4D4E-8730-8813342244D6}" srcId="{39BF1797-AF98-49D0-B587-7D2FE95969A2}" destId="{8FA0ACB3-00FB-4BBA-93DA-4CAAAF27151F}" srcOrd="3" destOrd="0" parTransId="{FCAD73E5-4EEC-45A1-AA92-8EE545C4EA5E}" sibTransId="{65D80577-5C52-46CE-B28F-6891E38918EB}"/>
     <dgm:cxn modelId="{35A8002B-103D-44EB-BB02-07E8356EECF8}" srcId="{39BF1797-AF98-49D0-B587-7D2FE95969A2}" destId="{87BB7EE1-4D29-4CCA-B372-B95AED09D489}" srcOrd="5" destOrd="0" parTransId="{5237AE63-7B85-4892-86EB-A039B1AB1B71}" sibTransId="{51B13E36-5F59-4500-A041-7E6C48A16975}"/>
     <dgm:cxn modelId="{A91ABE52-DAAC-4AFA-9AD1-AB1173AC23A3}" type="presOf" srcId="{39BF1797-AF98-49D0-B587-7D2FE95969A2}" destId="{2F0261AD-2B76-42EE-9B5C-41042C74716E}" srcOrd="0" destOrd="0" presId="urn:microsoft.com/office/officeart/2005/8/layout/list1"/>
@@ -13372,11 +13374,7 @@
             </a:br>
             <a:r>
               <a:rPr lang="en-US" dirty="0" smtClean="0"/>
-              <a:t> </a:t>
-            </a:r>
-            <a:r>
-              <a:rPr lang="en-US" dirty="0" smtClean="0"/>
-              <a:t>Data Flow Diagram</a:t>
+              <a:t> Data Flow Diagram</a:t>
             </a:r>
             <a:endParaRPr lang="en-US" dirty="0"/>
           </a:p>
@@ -13741,15 +13739,7 @@
             </a:br>
             <a:r>
               <a:rPr lang="en-US" dirty="0" smtClean="0"/>
-              <a:t> </a:t>
-            </a:r>
-            <a:r>
-              <a:rPr lang="en-US" dirty="0" smtClean="0"/>
-              <a:t>Sequence </a:t>
-            </a:r>
-            <a:r>
-              <a:rPr lang="en-US" dirty="0" smtClean="0"/>
-              <a:t>Diagram</a:t>
+              <a:t> Sequence Diagram</a:t>
             </a:r>
             <a:endParaRPr lang="en-US" dirty="0"/>
           </a:p>
@@ -14960,6 +14950,220 @@
 </p:sld>
 </file>
 
+<file path=ppt/slides/slide23.xml><?xml version="1.0" encoding="utf-8"?>
+<p:sld xmlns:a="http://schemas.openxmlformats.org/drawingml/2006/main" xmlns:r="http://schemas.openxmlformats.org/officeDocument/2006/relationships" xmlns:p="http://schemas.openxmlformats.org/presentationml/2006/main">
+  <p:cSld>
+    <p:spTree>
+      <p:nvGrpSpPr>
+        <p:cNvPr id="1" name=""/>
+        <p:cNvGrpSpPr/>
+        <p:nvPr/>
+      </p:nvGrpSpPr>
+      <p:grpSpPr>
+        <a:xfrm>
+          <a:off x="0" y="0"/>
+          <a:ext cx="0" cy="0"/>
+          <a:chOff x="0" y="0"/>
+          <a:chExt cx="0" cy="0"/>
+        </a:xfrm>
+      </p:grpSpPr>
+      <p:sp>
+        <p:nvSpPr>
+          <p:cNvPr id="2" name="Title 1"/>
+          <p:cNvSpPr>
+            <a:spLocks noGrp="1"/>
+          </p:cNvSpPr>
+          <p:nvPr>
+            <p:ph type="title"/>
+          </p:nvPr>
+        </p:nvSpPr>
+        <p:spPr>
+          <a:xfrm>
+            <a:off x="457200" y="2438400"/>
+            <a:ext cx="8229600" cy="1143000"/>
+          </a:xfrm>
+        </p:spPr>
+        <p:txBody>
+          <a:bodyPr/>
+          <a:lstStyle/>
+          <a:p>
+            <a:pPr algn="ctr"/>
+            <a:r>
+              <a:rPr lang="en-US" dirty="0" smtClean="0"/>
+              <a:t>Backup Slides</a:t>
+            </a:r>
+            <a:endParaRPr lang="en-US" dirty="0"/>
+          </a:p>
+        </p:txBody>
+      </p:sp>
+    </p:spTree>
+  </p:cSld>
+  <p:clrMapOvr>
+    <a:masterClrMapping/>
+  </p:clrMapOvr>
+</p:sld>
+</file>
+
+<file path=ppt/slides/slide24.xml><?xml version="1.0" encoding="utf-8"?>
+<p:sld xmlns:a="http://schemas.openxmlformats.org/drawingml/2006/main" xmlns:r="http://schemas.openxmlformats.org/officeDocument/2006/relationships" xmlns:p="http://schemas.openxmlformats.org/presentationml/2006/main">
+  <p:cSld>
+    <p:spTree>
+      <p:nvGrpSpPr>
+        <p:cNvPr id="1" name=""/>
+        <p:cNvGrpSpPr/>
+        <p:nvPr/>
+      </p:nvGrpSpPr>
+      <p:grpSpPr>
+        <a:xfrm>
+          <a:off x="0" y="0"/>
+          <a:ext cx="0" cy="0"/>
+          <a:chOff x="0" y="0"/>
+          <a:chExt cx="0" cy="0"/>
+        </a:xfrm>
+      </p:grpSpPr>
+      <p:sp>
+        <p:nvSpPr>
+          <p:cNvPr id="2" name="Title 1"/>
+          <p:cNvSpPr>
+            <a:spLocks noGrp="1"/>
+          </p:cNvSpPr>
+          <p:nvPr>
+            <p:ph type="title"/>
+          </p:nvPr>
+        </p:nvSpPr>
+        <p:spPr>
+          <a:xfrm>
+            <a:off x="457200" y="381000"/>
+            <a:ext cx="8229600" cy="1143000"/>
+          </a:xfrm>
+        </p:spPr>
+        <p:txBody>
+          <a:bodyPr/>
+          <a:lstStyle/>
+          <a:p>
+            <a:r>
+              <a:rPr lang="en-US" dirty="0" smtClean="0"/>
+              <a:t>Risks</a:t>
+            </a:r>
+            <a:endParaRPr lang="en-US" dirty="0"/>
+          </a:p>
+        </p:txBody>
+      </p:sp>
+      <p:sp>
+        <p:nvSpPr>
+          <p:cNvPr id="3" name="Content Placeholder 2"/>
+          <p:cNvSpPr>
+            <a:spLocks noGrp="1"/>
+          </p:cNvSpPr>
+          <p:nvPr>
+            <p:ph idx="1"/>
+          </p:nvPr>
+        </p:nvSpPr>
+        <p:spPr>
+          <a:xfrm>
+            <a:off x="304800" y="1447800"/>
+            <a:ext cx="8382000" cy="4876800"/>
+          </a:xfrm>
+        </p:spPr>
+        <p:txBody>
+          <a:bodyPr>
+            <a:normAutofit fontScale="92500" lnSpcReduction="20000"/>
+          </a:bodyPr>
+          <a:lstStyle/>
+          <a:p>
+            <a:r>
+              <a:rPr lang="en-US" dirty="0" smtClean="0"/>
+              <a:t>Being able to overlay captions to videos that reside on remote domains. </a:t>
+            </a:r>
+            <a:r>
+              <a:rPr lang="en-US" dirty="0" smtClean="0"/>
+              <a:t> -</a:t>
+            </a:r>
+            <a:r>
+              <a:rPr lang="en-US" i="1" dirty="0" smtClean="0"/>
+              <a:t>Flex seems to be able to do this.</a:t>
+            </a:r>
+          </a:p>
+          <a:p>
+            <a:endParaRPr lang="en-US" i="1" dirty="0" smtClean="0"/>
+          </a:p>
+          <a:p>
+            <a:r>
+              <a:rPr lang="en-US" dirty="0" smtClean="0"/>
+              <a:t>The </a:t>
+            </a:r>
+            <a:r>
+              <a:rPr lang="en-US" dirty="0" smtClean="0"/>
+              <a:t>ability to control Flash videos through a SWF player. </a:t>
+            </a:r>
+            <a:r>
+              <a:rPr lang="en-US" dirty="0" smtClean="0"/>
+              <a:t>–</a:t>
+            </a:r>
+            <a:r>
+              <a:rPr lang="en-US" i="1" dirty="0" smtClean="0"/>
+              <a:t>We now plan to write our own FLV player.</a:t>
+            </a:r>
+          </a:p>
+          <a:p>
+            <a:endParaRPr lang="en-US" i="1" dirty="0" smtClean="0"/>
+          </a:p>
+          <a:p>
+            <a:r>
+              <a:rPr lang="en-US" dirty="0" smtClean="0"/>
+              <a:t>The possibility that a video could have multiple </a:t>
+            </a:r>
+            <a:r>
+              <a:rPr lang="en-US" dirty="0" err="1" smtClean="0"/>
+              <a:t>video_id's</a:t>
+            </a:r>
+            <a:r>
+              <a:rPr lang="en-US" dirty="0" smtClean="0"/>
+              <a:t> associated with it. </a:t>
+            </a:r>
+            <a:r>
+              <a:rPr lang="en-US" dirty="0" smtClean="0"/>
+              <a:t>–</a:t>
+            </a:r>
+            <a:r>
+              <a:rPr lang="en-US" i="1" dirty="0" smtClean="0"/>
+              <a:t>Still being investigated, may not be an issue.  If it is, checksums are a possibility</a:t>
+            </a:r>
+          </a:p>
+          <a:p>
+            <a:endParaRPr lang="en-US" i="1" dirty="0" smtClean="0"/>
+          </a:p>
+          <a:p>
+            <a:r>
+              <a:rPr lang="en-US" dirty="0" smtClean="0"/>
+              <a:t>The possibility that users may store incorrect captions</a:t>
+            </a:r>
+            <a:r>
+              <a:rPr lang="en-US" dirty="0" smtClean="0"/>
+              <a:t>. –</a:t>
+            </a:r>
+            <a:r>
+              <a:rPr lang="en-US" i="1" dirty="0" smtClean="0"/>
+              <a:t>We have decided on an open and free environment and rely on the community for quality control.  Version rollback will also be available.</a:t>
+            </a:r>
+            <a:endParaRPr lang="en-US" i="1" dirty="0" smtClean="0"/>
+          </a:p>
+          <a:p>
+            <a:pPr>
+              <a:buNone/>
+            </a:pPr>
+            <a:endParaRPr lang="en-US" dirty="0"/>
+          </a:p>
+        </p:txBody>
+      </p:sp>
+    </p:spTree>
+  </p:cSld>
+  <p:clrMapOvr>
+    <a:masterClrMapping/>
+  </p:clrMapOvr>
+</p:sld>
+</file>
+
 <file path=ppt/slides/slide3.xml><?xml version="1.0" encoding="utf-8"?>
 <p:sld xmlns:a="http://schemas.openxmlformats.org/drawingml/2006/main" xmlns:r="http://schemas.openxmlformats.org/officeDocument/2006/relationships" xmlns:p="http://schemas.openxmlformats.org/presentationml/2006/main">
   <p:cSld>
@@ -15164,11 +15368,7 @@
             </a:br>
             <a:r>
               <a:rPr lang="en-US" dirty="0" smtClean="0"/>
-              <a:t> </a:t>
-            </a:r>
-            <a:r>
-              <a:rPr lang="en-US" dirty="0" smtClean="0"/>
-              <a:t>Class Diagram</a:t>
+              <a:t> Class Diagram</a:t>
             </a:r>
             <a:endParaRPr lang="en-US" dirty="0"/>
           </a:p>
@@ -15474,15 +15674,7 @@
             </a:br>
             <a:r>
               <a:rPr lang="en-US" dirty="0" smtClean="0"/>
-              <a:t> </a:t>
-            </a:r>
-            <a:r>
-              <a:rPr lang="en-US" dirty="0" smtClean="0"/>
-              <a:t>Deployment </a:t>
-            </a:r>
-            <a:r>
-              <a:rPr lang="en-US" dirty="0" smtClean="0"/>
-              <a:t>Diagram</a:t>
+              <a:t> Deployment Diagram</a:t>
             </a:r>
             <a:endParaRPr lang="en-US" dirty="0"/>
           </a:p>
@@ -15574,15 +15766,7 @@
             </a:br>
             <a:r>
               <a:rPr lang="en-US" dirty="0" smtClean="0"/>
-              <a:t> </a:t>
-            </a:r>
-            <a:r>
-              <a:rPr lang="en-US" dirty="0" smtClean="0"/>
-              <a:t>Database </a:t>
-            </a:r>
-            <a:r>
-              <a:rPr lang="en-US" dirty="0" smtClean="0"/>
-              <a:t>Diagram</a:t>
+              <a:t> Database Diagram</a:t>
             </a:r>
             <a:endParaRPr lang="en-US" dirty="0"/>
           </a:p>

</xml_diff>